<commit_message>
Got rid of the errant submodules
</commit_message>
<xml_diff>
--- a/presentation/Mobile Sensors Workshop, Part 1.pptx
+++ b/presentation/Mobile Sensors Workshop, Part 1.pptx
@@ -301,7 +301,7 @@
           <a:p>
             <a:fld id="{A7AD6539-BFAA-4A00-BACF-58AADCC3B4BB}" type="datetimeFigureOut">
               <a:rPr lang="en-US" smtClean="0"/>
-              <a:t>10/17/2014</a:t>
+              <a:t>10/18/2014</a:t>
             </a:fld>
             <a:endParaRPr lang="en-US"/>
           </a:p>
@@ -471,7 +471,7 @@
           <a:p>
             <a:fld id="{A7AD6539-BFAA-4A00-BACF-58AADCC3B4BB}" type="datetimeFigureOut">
               <a:rPr lang="en-US" smtClean="0"/>
-              <a:t>10/17/2014</a:t>
+              <a:t>10/18/2014</a:t>
             </a:fld>
             <a:endParaRPr lang="en-US"/>
           </a:p>
@@ -651,7 +651,7 @@
           <a:p>
             <a:fld id="{A7AD6539-BFAA-4A00-BACF-58AADCC3B4BB}" type="datetimeFigureOut">
               <a:rPr lang="en-US" smtClean="0"/>
-              <a:t>10/17/2014</a:t>
+              <a:t>10/18/2014</a:t>
             </a:fld>
             <a:endParaRPr lang="en-US"/>
           </a:p>
@@ -821,7 +821,7 @@
           <a:p>
             <a:fld id="{A7AD6539-BFAA-4A00-BACF-58AADCC3B4BB}" type="datetimeFigureOut">
               <a:rPr lang="en-US" smtClean="0"/>
-              <a:t>10/17/2014</a:t>
+              <a:t>10/18/2014</a:t>
             </a:fld>
             <a:endParaRPr lang="en-US"/>
           </a:p>
@@ -1067,7 +1067,7 @@
           <a:p>
             <a:fld id="{A7AD6539-BFAA-4A00-BACF-58AADCC3B4BB}" type="datetimeFigureOut">
               <a:rPr lang="en-US" smtClean="0"/>
-              <a:t>10/17/2014</a:t>
+              <a:t>10/18/2014</a:t>
             </a:fld>
             <a:endParaRPr lang="en-US"/>
           </a:p>
@@ -1299,7 +1299,7 @@
           <a:p>
             <a:fld id="{A7AD6539-BFAA-4A00-BACF-58AADCC3B4BB}" type="datetimeFigureOut">
               <a:rPr lang="en-US" smtClean="0"/>
-              <a:t>10/17/2014</a:t>
+              <a:t>10/18/2014</a:t>
             </a:fld>
             <a:endParaRPr lang="en-US"/>
           </a:p>
@@ -1666,7 +1666,7 @@
           <a:p>
             <a:fld id="{A7AD6539-BFAA-4A00-BACF-58AADCC3B4BB}" type="datetimeFigureOut">
               <a:rPr lang="en-US" smtClean="0"/>
-              <a:t>10/17/2014</a:t>
+              <a:t>10/18/2014</a:t>
             </a:fld>
             <a:endParaRPr lang="en-US"/>
           </a:p>
@@ -1784,7 +1784,7 @@
           <a:p>
             <a:fld id="{A7AD6539-BFAA-4A00-BACF-58AADCC3B4BB}" type="datetimeFigureOut">
               <a:rPr lang="en-US" smtClean="0"/>
-              <a:t>10/17/2014</a:t>
+              <a:t>10/18/2014</a:t>
             </a:fld>
             <a:endParaRPr lang="en-US"/>
           </a:p>
@@ -1879,7 +1879,7 @@
           <a:p>
             <a:fld id="{A7AD6539-BFAA-4A00-BACF-58AADCC3B4BB}" type="datetimeFigureOut">
               <a:rPr lang="en-US" smtClean="0"/>
-              <a:t>10/17/2014</a:t>
+              <a:t>10/18/2014</a:t>
             </a:fld>
             <a:endParaRPr lang="en-US"/>
           </a:p>
@@ -2156,7 +2156,7 @@
           <a:p>
             <a:fld id="{A7AD6539-BFAA-4A00-BACF-58AADCC3B4BB}" type="datetimeFigureOut">
               <a:rPr lang="en-US" smtClean="0"/>
-              <a:t>10/17/2014</a:t>
+              <a:t>10/18/2014</a:t>
             </a:fld>
             <a:endParaRPr lang="en-US"/>
           </a:p>
@@ -2409,7 +2409,7 @@
           <a:p>
             <a:fld id="{A7AD6539-BFAA-4A00-BACF-58AADCC3B4BB}" type="datetimeFigureOut">
               <a:rPr lang="en-US" smtClean="0"/>
-              <a:t>10/17/2014</a:t>
+              <a:t>10/18/2014</a:t>
             </a:fld>
             <a:endParaRPr lang="en-US"/>
           </a:p>
@@ -2622,7 +2622,7 @@
           <a:p>
             <a:fld id="{A7AD6539-BFAA-4A00-BACF-58AADCC3B4BB}" type="datetimeFigureOut">
               <a:rPr lang="en-US" smtClean="0"/>
-              <a:t>10/17/2014</a:t>
+              <a:t>10/18/2014</a:t>
             </a:fld>
             <a:endParaRPr lang="en-US"/>
           </a:p>
@@ -3091,6 +3091,13 @@
   <p:clrMapOvr>
     <a:masterClrMapping/>
   </p:clrMapOvr>
+  <p:timing>
+    <p:tnLst>
+      <p:par>
+        <p:cTn id="1" dur="indefinite" restart="never" nodeType="tmRoot"/>
+      </p:par>
+    </p:tnLst>
+  </p:timing>
 </p:sld>
 </file>
 
@@ -4986,11 +4993,7 @@
             </a:r>
             <a:r>
               <a:rPr lang="en-US" dirty="0" smtClean="0"/>
-              <a:t> </a:t>
-            </a:r>
-            <a:r>
-              <a:rPr lang="en-US" dirty="0" smtClean="0"/>
-              <a:t>theorem</a:t>
+              <a:t> theorem</a:t>
             </a:r>
             <a:endParaRPr lang="en-US" dirty="0"/>
           </a:p>
@@ -5059,19 +5062,7 @@
             </a:r>
             <a:r>
               <a:rPr lang="en-US" dirty="0" smtClean="0"/>
-              <a:t> is also </a:t>
-            </a:r>
-            <a:r>
-              <a:rPr lang="en-US" dirty="0" smtClean="0"/>
-              <a:t>called </a:t>
-            </a:r>
-            <a:r>
-              <a:rPr lang="en-US" dirty="0" smtClean="0"/>
-              <a:t>impedance when we’re talking about circuit </a:t>
-            </a:r>
-            <a:r>
-              <a:rPr lang="en-US" dirty="0" smtClean="0"/>
-              <a:t>outputs.</a:t>
+              <a:t> is also called impedance when we’re talking about circuit outputs.</a:t>
             </a:r>
           </a:p>
           <a:p>
@@ -5083,11 +5074,7 @@
           <a:p>
             <a:r>
               <a:rPr lang="en-US" dirty="0" smtClean="0"/>
-              <a:t>For quasi-DC circuits, ideal outputs have 0 impedance &amp; ideal </a:t>
-            </a:r>
-            <a:r>
-              <a:rPr lang="en-US" dirty="0" smtClean="0"/>
-              <a:t>inputs have ∞ impedance.</a:t>
+              <a:t>For quasi-DC circuits, ideal outputs have 0 impedance &amp; ideal inputs have ∞ impedance.</a:t>
             </a:r>
           </a:p>
           <a:p>
@@ -5503,6 +5490,13 @@
   <p:clrMapOvr>
     <a:masterClrMapping/>
   </p:clrMapOvr>
+  <p:timing>
+    <p:tnLst>
+      <p:par>
+        <p:cTn id="1" dur="indefinite" restart="never" nodeType="tmRoot"/>
+      </p:par>
+    </p:tnLst>
+  </p:timing>
 </p:sld>
 </file>
 
@@ -6040,11 +6034,7 @@
           <a:p>
             <a:r>
               <a:rPr lang="en-US" dirty="0" smtClean="0"/>
-              <a:t>Poor </a:t>
-            </a:r>
-            <a:r>
-              <a:rPr lang="en-US" dirty="0" smtClean="0"/>
-              <a:t>durability</a:t>
+              <a:t>Poor durability</a:t>
             </a:r>
           </a:p>
           <a:p>
@@ -6052,7 +6042,6 @@
               <a:rPr lang="en-US" dirty="0" smtClean="0"/>
               <a:t>Output impedance is excessively high, so it is sensitive to loading.</a:t>
             </a:r>
-            <a:endParaRPr lang="en-US" dirty="0" smtClean="0"/>
           </a:p>
           <a:p>
             <a:endParaRPr lang="en-US" dirty="0"/>
@@ -6939,9 +6928,22 @@
           </a:p>
           <a:p>
             <a:r>
-              <a:rPr lang="en-US" dirty="0" smtClean="0"/>
-              <a:t>Class files</a:t>
-            </a:r>
+              <a:rPr lang="en-US" smtClean="0"/>
+              <a:t>Class </a:t>
+            </a:r>
+            <a:r>
+              <a:rPr lang="en-US"/>
+              <a:t>files (https</a:t>
+            </a:r>
+            <a:r>
+              <a:rPr lang="en-US"/>
+              <a:t>://</a:t>
+            </a:r>
+            <a:r>
+              <a:rPr lang="en-US" smtClean="0"/>
+              <a:t>github.com/logos-electromechanical/SensorWorkshop)</a:t>
+            </a:r>
+            <a:endParaRPr lang="en-US" dirty="0" smtClean="0"/>
           </a:p>
           <a:p>
             <a:r>
@@ -6964,6 +6966,13 @@
   <p:clrMapOvr>
     <a:masterClrMapping/>
   </p:clrMapOvr>
+  <p:timing>
+    <p:tnLst>
+      <p:par>
+        <p:cTn id="1" dur="indefinite" restart="never" nodeType="tmRoot"/>
+      </p:par>
+    </p:tnLst>
+  </p:timing>
 </p:sld>
 </file>
 
@@ -9141,6 +9150,13 @@
   <p:clrMapOvr>
     <a:masterClrMapping/>
   </p:clrMapOvr>
+  <p:timing>
+    <p:tnLst>
+      <p:par>
+        <p:cTn id="1" dur="indefinite" restart="never" nodeType="tmRoot"/>
+      </p:par>
+    </p:tnLst>
+  </p:timing>
 </p:sld>
 </file>
 
@@ -12053,6 +12069,13 @@
   <p:clrMapOvr>
     <a:masterClrMapping/>
   </p:clrMapOvr>
+  <p:timing>
+    <p:tnLst>
+      <p:par>
+        <p:cTn id="1" dur="indefinite" restart="never" nodeType="tmRoot"/>
+      </p:par>
+    </p:tnLst>
+  </p:timing>
 </p:sld>
 </file>
 

</xml_diff>

<commit_message>
Modified digital class files for available supplies
</commit_message>
<xml_diff>
--- a/presentation/Mobile Sensors Workshop, Part 1.pptx
+++ b/presentation/Mobile Sensors Workshop, Part 1.pptx
@@ -44,9 +44,9 @@
     <p:sldId id="293" r:id="rId38"/>
     <p:sldId id="285" r:id="rId39"/>
     <p:sldId id="286" r:id="rId40"/>
-    <p:sldId id="318" r:id="rId41"/>
-    <p:sldId id="298" r:id="rId42"/>
-    <p:sldId id="289" r:id="rId43"/>
+    <p:sldId id="289" r:id="rId41"/>
+    <p:sldId id="318" r:id="rId42"/>
+    <p:sldId id="298" r:id="rId43"/>
     <p:sldId id="287" r:id="rId44"/>
     <p:sldId id="288" r:id="rId45"/>
     <p:sldId id="290" r:id="rId46"/>
@@ -9039,6 +9039,135 @@
           <a:p>
             <a:r>
               <a:rPr lang="en-US" dirty="0" smtClean="0"/>
+              <a:t>A quick word about ground</a:t>
+            </a:r>
+            <a:endParaRPr lang="en-US" dirty="0"/>
+          </a:p>
+        </p:txBody>
+      </p:sp>
+      <p:sp>
+        <p:nvSpPr>
+          <p:cNvPr id="3" name="Content Placeholder 2"/>
+          <p:cNvSpPr>
+            <a:spLocks noGrp="1"/>
+          </p:cNvSpPr>
+          <p:nvPr>
+            <p:ph idx="1"/>
+          </p:nvPr>
+        </p:nvSpPr>
+        <p:spPr>
+          <a:xfrm>
+            <a:off x="838200" y="1825624"/>
+            <a:ext cx="3733800" cy="4815807"/>
+          </a:xfrm>
+        </p:spPr>
+        <p:txBody>
+          <a:bodyPr/>
+          <a:lstStyle/>
+          <a:p>
+            <a:r>
+              <a:rPr lang="en-US" dirty="0" smtClean="0"/>
+              <a:t>Ground in all these circuits is where you choose to put it.</a:t>
+            </a:r>
+          </a:p>
+          <a:p>
+            <a:r>
+              <a:rPr lang="en-US" dirty="0" smtClean="0"/>
+              <a:t>Therefore, we can use it to introduce output offset</a:t>
+            </a:r>
+          </a:p>
+          <a:p>
+            <a:pPr marL="0" indent="0">
+              <a:buNone/>
+            </a:pPr>
+            <a:endParaRPr lang="en-US" dirty="0"/>
+          </a:p>
+        </p:txBody>
+      </p:sp>
+      <p:pic>
+        <p:nvPicPr>
+          <p:cNvPr id="4" name="Picture 3"/>
+          <p:cNvPicPr>
+            <a:picLocks noChangeAspect="1"/>
+          </p:cNvPicPr>
+          <p:nvPr/>
+        </p:nvPicPr>
+        <p:blipFill>
+          <a:blip r:embed="rId2">
+            <a:extLst>
+              <a:ext uri="{28A0092B-C50C-407E-A947-70E740481C1C}">
+                <a14:useLocalDpi xmlns:a14="http://schemas.microsoft.com/office/drawing/2010/main" val="0"/>
+              </a:ext>
+            </a:extLst>
+          </a:blip>
+          <a:stretch>
+            <a:fillRect/>
+          </a:stretch>
+        </p:blipFill>
+        <p:spPr>
+          <a:xfrm>
+            <a:off x="4571999" y="1825624"/>
+            <a:ext cx="7448165" cy="4309813"/>
+          </a:xfrm>
+          <a:prstGeom prst="rect">
+            <a:avLst/>
+          </a:prstGeom>
+        </p:spPr>
+      </p:pic>
+    </p:spTree>
+    <p:extLst>
+      <p:ext uri="{BB962C8B-B14F-4D97-AF65-F5344CB8AC3E}">
+        <p14:creationId xmlns:p14="http://schemas.microsoft.com/office/powerpoint/2010/main" val="2700403819"/>
+      </p:ext>
+    </p:extLst>
+  </p:cSld>
+  <p:clrMapOvr>
+    <a:masterClrMapping/>
+  </p:clrMapOvr>
+  <p:timing>
+    <p:tnLst>
+      <p:par>
+        <p:cTn id="1" dur="indefinite" restart="never" nodeType="tmRoot"/>
+      </p:par>
+    </p:tnLst>
+  </p:timing>
+</p:sld>
+</file>
+
+<file path=ppt/slides/slide41.xml><?xml version="1.0" encoding="utf-8"?>
+<p:sld xmlns:a="http://schemas.openxmlformats.org/drawingml/2006/main" xmlns:r="http://schemas.openxmlformats.org/officeDocument/2006/relationships" xmlns:p="http://schemas.openxmlformats.org/presentationml/2006/main">
+  <p:cSld>
+    <p:spTree>
+      <p:nvGrpSpPr>
+        <p:cNvPr id="1" name=""/>
+        <p:cNvGrpSpPr/>
+        <p:nvPr/>
+      </p:nvGrpSpPr>
+      <p:grpSpPr>
+        <a:xfrm>
+          <a:off x="0" y="0"/>
+          <a:ext cx="0" cy="0"/>
+          <a:chOff x="0" y="0"/>
+          <a:chExt cx="0" cy="0"/>
+        </a:xfrm>
+      </p:grpSpPr>
+      <p:sp>
+        <p:nvSpPr>
+          <p:cNvPr id="2" name="Title 1"/>
+          <p:cNvSpPr>
+            <a:spLocks noGrp="1"/>
+          </p:cNvSpPr>
+          <p:nvPr>
+            <p:ph type="title"/>
+          </p:nvPr>
+        </p:nvSpPr>
+        <p:spPr/>
+        <p:txBody>
+          <a:bodyPr/>
+          <a:lstStyle/>
+          <a:p>
+            <a:r>
+              <a:rPr lang="en-US" dirty="0" smtClean="0"/>
               <a:t>Adding an amplifier to the bend sensor…</a:t>
             </a:r>
             <a:endParaRPr lang="en-US" dirty="0"/>
@@ -9094,7 +9223,7 @@
 </p:sld>
 </file>
 
-<file path=ppt/slides/slide41.xml><?xml version="1.0" encoding="utf-8"?>
+<file path=ppt/slides/slide42.xml><?xml version="1.0" encoding="utf-8"?>
 <p:sld xmlns:a="http://schemas.openxmlformats.org/drawingml/2006/main" xmlns:r="http://schemas.openxmlformats.org/officeDocument/2006/relationships" xmlns:p="http://schemas.openxmlformats.org/presentationml/2006/main">
   <p:cSld>
     <p:spTree>
@@ -9170,135 +9299,6 @@
     <p:extLst>
       <p:ext uri="{BB962C8B-B14F-4D97-AF65-F5344CB8AC3E}">
         <p14:creationId xmlns:p14="http://schemas.microsoft.com/office/powerpoint/2010/main" val="2577411376"/>
-      </p:ext>
-    </p:extLst>
-  </p:cSld>
-  <p:clrMapOvr>
-    <a:masterClrMapping/>
-  </p:clrMapOvr>
-  <p:timing>
-    <p:tnLst>
-      <p:par>
-        <p:cTn id="1" dur="indefinite" restart="never" nodeType="tmRoot"/>
-      </p:par>
-    </p:tnLst>
-  </p:timing>
-</p:sld>
-</file>
-
-<file path=ppt/slides/slide42.xml><?xml version="1.0" encoding="utf-8"?>
-<p:sld xmlns:a="http://schemas.openxmlformats.org/drawingml/2006/main" xmlns:r="http://schemas.openxmlformats.org/officeDocument/2006/relationships" xmlns:p="http://schemas.openxmlformats.org/presentationml/2006/main">
-  <p:cSld>
-    <p:spTree>
-      <p:nvGrpSpPr>
-        <p:cNvPr id="1" name=""/>
-        <p:cNvGrpSpPr/>
-        <p:nvPr/>
-      </p:nvGrpSpPr>
-      <p:grpSpPr>
-        <a:xfrm>
-          <a:off x="0" y="0"/>
-          <a:ext cx="0" cy="0"/>
-          <a:chOff x="0" y="0"/>
-          <a:chExt cx="0" cy="0"/>
-        </a:xfrm>
-      </p:grpSpPr>
-      <p:sp>
-        <p:nvSpPr>
-          <p:cNvPr id="2" name="Title 1"/>
-          <p:cNvSpPr>
-            <a:spLocks noGrp="1"/>
-          </p:cNvSpPr>
-          <p:nvPr>
-            <p:ph type="title"/>
-          </p:nvPr>
-        </p:nvSpPr>
-        <p:spPr/>
-        <p:txBody>
-          <a:bodyPr/>
-          <a:lstStyle/>
-          <a:p>
-            <a:r>
-              <a:rPr lang="en-US" dirty="0" smtClean="0"/>
-              <a:t>A quick word about ground</a:t>
-            </a:r>
-            <a:endParaRPr lang="en-US" dirty="0"/>
-          </a:p>
-        </p:txBody>
-      </p:sp>
-      <p:sp>
-        <p:nvSpPr>
-          <p:cNvPr id="3" name="Content Placeholder 2"/>
-          <p:cNvSpPr>
-            <a:spLocks noGrp="1"/>
-          </p:cNvSpPr>
-          <p:nvPr>
-            <p:ph idx="1"/>
-          </p:nvPr>
-        </p:nvSpPr>
-        <p:spPr>
-          <a:xfrm>
-            <a:off x="838200" y="1825624"/>
-            <a:ext cx="3733800" cy="4815807"/>
-          </a:xfrm>
-        </p:spPr>
-        <p:txBody>
-          <a:bodyPr/>
-          <a:lstStyle/>
-          <a:p>
-            <a:r>
-              <a:rPr lang="en-US" dirty="0" smtClean="0"/>
-              <a:t>Ground in all these circuits is where you choose to put it.</a:t>
-            </a:r>
-          </a:p>
-          <a:p>
-            <a:r>
-              <a:rPr lang="en-US" dirty="0" smtClean="0"/>
-              <a:t>Therefore, we can use it to introduce output offset</a:t>
-            </a:r>
-          </a:p>
-          <a:p>
-            <a:pPr marL="0" indent="0">
-              <a:buNone/>
-            </a:pPr>
-            <a:endParaRPr lang="en-US" dirty="0"/>
-          </a:p>
-        </p:txBody>
-      </p:sp>
-      <p:pic>
-        <p:nvPicPr>
-          <p:cNvPr id="4" name="Picture 3"/>
-          <p:cNvPicPr>
-            <a:picLocks noChangeAspect="1"/>
-          </p:cNvPicPr>
-          <p:nvPr/>
-        </p:nvPicPr>
-        <p:blipFill>
-          <a:blip r:embed="rId2">
-            <a:extLst>
-              <a:ext uri="{28A0092B-C50C-407E-A947-70E740481C1C}">
-                <a14:useLocalDpi xmlns:a14="http://schemas.microsoft.com/office/drawing/2010/main" val="0"/>
-              </a:ext>
-            </a:extLst>
-          </a:blip>
-          <a:stretch>
-            <a:fillRect/>
-          </a:stretch>
-        </p:blipFill>
-        <p:spPr>
-          <a:xfrm>
-            <a:off x="4571999" y="1825624"/>
-            <a:ext cx="7448165" cy="4309813"/>
-          </a:xfrm>
-          <a:prstGeom prst="rect">
-            <a:avLst/>
-          </a:prstGeom>
-        </p:spPr>
-      </p:pic>
-    </p:spTree>
-    <p:extLst>
-      <p:ext uri="{BB962C8B-B14F-4D97-AF65-F5344CB8AC3E}">
-        <p14:creationId xmlns:p14="http://schemas.microsoft.com/office/powerpoint/2010/main" val="2700403819"/>
       </p:ext>
     </p:extLst>
   </p:cSld>

</xml_diff>